<commit_message>
Updating for 2019 version
</commit_message>
<xml_diff>
--- a/re_slides.pptx
+++ b/re_slides.pptx
@@ -14,7 +14,7 @@
     <p:sldId id="256" r:id="rId2"/>
     <p:sldId id="270" r:id="rId3"/>
     <p:sldId id="267" r:id="rId4"/>
-    <p:sldId id="268" r:id="rId5"/>
+    <p:sldId id="271" r:id="rId5"/>
     <p:sldId id="269" r:id="rId6"/>
     <p:sldId id="258" r:id="rId7"/>
     <p:sldId id="260" r:id="rId8"/>
@@ -217,7 +217,7 @@
           <a:p>
             <a:fld id="{D74C808E-3123-DD46-9BFA-0A714AD65C82}" type="datetimeFigureOut">
               <a:rPr lang="en-US" smtClean="0"/>
-              <a:t>1/18/18</a:t>
+              <a:t>1/14/19</a:t>
             </a:fld>
             <a:endParaRPr lang="en-US"/>
           </a:p>
@@ -382,7 +382,7 @@
           <a:p>
             <a:fld id="{039E9B77-20DD-334D-9FFB-3953624F1CAF}" type="datetimeFigureOut">
               <a:rPr lang="en-US" smtClean="0"/>
-              <a:t>1/18/18</a:t>
+              <a:t>1/14/19</a:t>
             </a:fld>
             <a:endParaRPr lang="en-US"/>
           </a:p>
@@ -831,7 +831,7 @@
           <a:p>
             <a:fld id="{138F3AD7-1FBA-784E-AA5B-AD5729536BE7}" type="datetimeFigureOut">
               <a:rPr lang="en-US" smtClean="0"/>
-              <a:t>1/18/18</a:t>
+              <a:t>1/14/19</a:t>
             </a:fld>
             <a:endParaRPr lang="en-US"/>
           </a:p>
@@ -1001,7 +1001,7 @@
           <a:p>
             <a:fld id="{138F3AD7-1FBA-784E-AA5B-AD5729536BE7}" type="datetimeFigureOut">
               <a:rPr lang="en-US" smtClean="0"/>
-              <a:t>1/18/18</a:t>
+              <a:t>1/14/19</a:t>
             </a:fld>
             <a:endParaRPr lang="en-US"/>
           </a:p>
@@ -1181,7 +1181,7 @@
           <a:p>
             <a:fld id="{138F3AD7-1FBA-784E-AA5B-AD5729536BE7}" type="datetimeFigureOut">
               <a:rPr lang="en-US" smtClean="0"/>
-              <a:t>1/18/18</a:t>
+              <a:t>1/14/19</a:t>
             </a:fld>
             <a:endParaRPr lang="en-US"/>
           </a:p>
@@ -1351,7 +1351,7 @@
           <a:p>
             <a:fld id="{138F3AD7-1FBA-784E-AA5B-AD5729536BE7}" type="datetimeFigureOut">
               <a:rPr lang="en-US" smtClean="0"/>
-              <a:t>1/18/18</a:t>
+              <a:t>1/14/19</a:t>
             </a:fld>
             <a:endParaRPr lang="en-US"/>
           </a:p>
@@ -1597,7 +1597,7 @@
           <a:p>
             <a:fld id="{138F3AD7-1FBA-784E-AA5B-AD5729536BE7}" type="datetimeFigureOut">
               <a:rPr lang="en-US" smtClean="0"/>
-              <a:t>1/18/18</a:t>
+              <a:t>1/14/19</a:t>
             </a:fld>
             <a:endParaRPr lang="en-US"/>
           </a:p>
@@ -1885,7 +1885,7 @@
           <a:p>
             <a:fld id="{138F3AD7-1FBA-784E-AA5B-AD5729536BE7}" type="datetimeFigureOut">
               <a:rPr lang="en-US" smtClean="0"/>
-              <a:t>1/18/18</a:t>
+              <a:t>1/14/19</a:t>
             </a:fld>
             <a:endParaRPr lang="en-US"/>
           </a:p>
@@ -2307,7 +2307,7 @@
           <a:p>
             <a:fld id="{138F3AD7-1FBA-784E-AA5B-AD5729536BE7}" type="datetimeFigureOut">
               <a:rPr lang="en-US" smtClean="0"/>
-              <a:t>1/18/18</a:t>
+              <a:t>1/14/19</a:t>
             </a:fld>
             <a:endParaRPr lang="en-US"/>
           </a:p>
@@ -2425,7 +2425,7 @@
           <a:p>
             <a:fld id="{138F3AD7-1FBA-784E-AA5B-AD5729536BE7}" type="datetimeFigureOut">
               <a:rPr lang="en-US" smtClean="0"/>
-              <a:t>1/18/18</a:t>
+              <a:t>1/14/19</a:t>
             </a:fld>
             <a:endParaRPr lang="en-US"/>
           </a:p>
@@ -2520,7 +2520,7 @@
           <a:p>
             <a:fld id="{138F3AD7-1FBA-784E-AA5B-AD5729536BE7}" type="datetimeFigureOut">
               <a:rPr lang="en-US" smtClean="0"/>
-              <a:t>1/18/18</a:t>
+              <a:t>1/14/19</a:t>
             </a:fld>
             <a:endParaRPr lang="en-US"/>
           </a:p>
@@ -2797,7 +2797,7 @@
           <a:p>
             <a:fld id="{138F3AD7-1FBA-784E-AA5B-AD5729536BE7}" type="datetimeFigureOut">
               <a:rPr lang="en-US" smtClean="0"/>
-              <a:t>1/18/18</a:t>
+              <a:t>1/14/19</a:t>
             </a:fld>
             <a:endParaRPr lang="en-US"/>
           </a:p>
@@ -3050,7 +3050,7 @@
           <a:p>
             <a:fld id="{138F3AD7-1FBA-784E-AA5B-AD5729536BE7}" type="datetimeFigureOut">
               <a:rPr lang="en-US" smtClean="0"/>
-              <a:t>1/18/18</a:t>
+              <a:t>1/14/19</a:t>
             </a:fld>
             <a:endParaRPr lang="en-US"/>
           </a:p>
@@ -3263,7 +3263,7 @@
           <a:p>
             <a:fld id="{138F3AD7-1FBA-784E-AA5B-AD5729536BE7}" type="datetimeFigureOut">
               <a:rPr lang="en-US" smtClean="0"/>
-              <a:t>1/18/18</a:t>
+              <a:t>1/14/19</a:t>
             </a:fld>
             <a:endParaRPr lang="en-US"/>
           </a:p>
@@ -3714,7 +3714,7 @@
         </p:nvSpPr>
         <p:spPr>
           <a:xfrm>
-            <a:off x="2699793" y="4697631"/>
+            <a:off x="1861593" y="4697631"/>
             <a:ext cx="1745991" cy="923330"/>
           </a:xfrm>
           <a:prstGeom prst="rect">
@@ -3744,14 +3744,7 @@
                 <a:latin typeface="CMU Sans Serif"/>
                 <a:cs typeface="CMU Sans Serif"/>
               </a:rPr>
-              <a:t>MIT </a:t>
-            </a:r>
-            <a:r>
-              <a:rPr lang="en-US" dirty="0" smtClean="0">
-                <a:latin typeface="CMU Sans Serif"/>
-                <a:cs typeface="CMU Sans Serif"/>
-              </a:rPr>
-              <a:t>CSAIL</a:t>
+              <a:t>MIT CSAIL</a:t>
             </a:r>
           </a:p>
           <a:p>
@@ -3785,8 +3778,8 @@
         </p:nvSpPr>
         <p:spPr>
           <a:xfrm>
-            <a:off x="4763291" y="4697631"/>
-            <a:ext cx="1962397" cy="923330"/>
+            <a:off x="6090198" y="4697631"/>
+            <a:ext cx="1848583" cy="646331"/>
           </a:xfrm>
           <a:prstGeom prst="rect">
             <a:avLst/>
@@ -3805,13 +3798,53 @@
                 <a:latin typeface="CMU Sans Serif"/>
                 <a:cs typeface="CMU Sans Serif"/>
               </a:rPr>
-              <a:t>Rahul Sridhar</a:t>
-            </a:r>
-            <a:endParaRPr lang="en-US" dirty="0" smtClean="0">
+              <a:t>Joe Leong</a:t>
+            </a:r>
+          </a:p>
+          <a:p>
+            <a:pPr algn="ctr"/>
+            <a:r>
+              <a:rPr lang="en-US" dirty="0" err="1">
+                <a:latin typeface="CMU Sans Serif"/>
+                <a:cs typeface="CMU Sans Serif"/>
+              </a:rPr>
+              <a:t>joeleong</a:t>
+            </a:r>
+            <a:r>
+              <a:rPr lang="en-US" dirty="0" err="1" smtClean="0">
+                <a:latin typeface="CMU Sans Serif"/>
+                <a:cs typeface="CMU Sans Serif"/>
+              </a:rPr>
+              <a:t>@mit.edu</a:t>
+            </a:r>
+            <a:endParaRPr lang="en-US" dirty="0">
               <a:latin typeface="CMU Sans Serif"/>
               <a:cs typeface="CMU Sans Serif"/>
             </a:endParaRPr>
           </a:p>
+        </p:txBody>
+      </p:sp>
+      <p:sp>
+        <p:nvSpPr>
+          <p:cNvPr id="6" name="TextBox 5"/>
+          <p:cNvSpPr txBox="1"/>
+          <p:nvPr/>
+        </p:nvSpPr>
+        <p:spPr>
+          <a:xfrm>
+            <a:off x="4067217" y="4697631"/>
+            <a:ext cx="1739580" cy="923330"/>
+          </a:xfrm>
+          <a:prstGeom prst="rect">
+            <a:avLst/>
+          </a:prstGeom>
+          <a:noFill/>
+        </p:spPr>
+        <p:txBody>
+          <a:bodyPr wrap="none" rtlCol="0">
+            <a:spAutoFit/>
+          </a:bodyPr>
+          <a:lstStyle/>
           <a:p>
             <a:pPr algn="ctr"/>
             <a:r>
@@ -3819,7 +3852,17 @@
                 <a:latin typeface="CMU Sans Serif"/>
                 <a:cs typeface="CMU Sans Serif"/>
               </a:rPr>
-              <a:t>MIT Lincoln Labs</a:t>
+              <a:t>Mike Specter</a:t>
+            </a:r>
+          </a:p>
+          <a:p>
+            <a:pPr algn="ctr"/>
+            <a:r>
+              <a:rPr lang="en-US" dirty="0" smtClean="0">
+                <a:latin typeface="CMU Sans Serif"/>
+                <a:cs typeface="CMU Sans Serif"/>
+              </a:rPr>
+              <a:t>MIT CSAIL</a:t>
             </a:r>
           </a:p>
           <a:p>
@@ -3829,14 +3872,14 @@
                 <a:latin typeface="CMU Sans Serif"/>
                 <a:cs typeface="CMU Sans Serif"/>
               </a:rPr>
-              <a:t>r</a:t>
+              <a:t>specter</a:t>
             </a:r>
             <a:r>
               <a:rPr lang="en-US" dirty="0" err="1" smtClean="0">
                 <a:latin typeface="CMU Sans Serif"/>
                 <a:cs typeface="CMU Sans Serif"/>
               </a:rPr>
-              <a:t>sridhar@mit.edu</a:t>
+              <a:t>@mit.edu</a:t>
             </a:r>
             <a:endParaRPr lang="en-US" dirty="0">
               <a:latin typeface="CMU Sans Serif"/>
@@ -4365,10 +4408,6 @@
               </a:rPr>
               <a:t>Forward Engineering</a:t>
             </a:r>
-            <a:endParaRPr lang="en-US" sz="4000" dirty="0" smtClean="0">
-              <a:latin typeface="CMU Sans Serif"/>
-              <a:cs typeface="CMU Sans Serif"/>
-            </a:endParaRPr>
           </a:p>
         </p:txBody>
       </p:sp>
@@ -4699,16 +4738,16 @@
           <a:lstStyle/>
           <a:p>
             <a:r>
-              <a:rPr lang="en-US" b="1" dirty="0" smtClean="0"/>
+              <a:rPr lang="en-US" dirty="0" smtClean="0"/>
               <a:t>Exploitation</a:t>
             </a:r>
           </a:p>
           <a:p>
             <a:r>
-              <a:rPr lang="en-US" b="1" dirty="0" smtClean="0"/>
+              <a:rPr lang="en-US" dirty="0" smtClean="0"/>
               <a:t>Binary modification</a:t>
             </a:r>
-            <a:endParaRPr lang="en-US" b="1" dirty="0"/>
+            <a:endParaRPr lang="en-US" dirty="0"/>
           </a:p>
           <a:p>
             <a:r>
@@ -4728,7 +4767,7 @@
     </p:spTree>
     <p:extLst>
       <p:ext uri="{BB962C8B-B14F-4D97-AF65-F5344CB8AC3E}">
-        <p14:creationId xmlns:p14="http://schemas.microsoft.com/office/powerpoint/2010/main" val="937986572"/>
+        <p14:creationId xmlns:p14="http://schemas.microsoft.com/office/powerpoint/2010/main" val="197467808"/>
       </p:ext>
     </p:extLst>
   </p:cSld>

</xml_diff>